<commit_message>
Subtle comparison with other tools
</commit_message>
<xml_diff>
--- a/R PROGRAMMING SESSION 1 Briefing About R and RStudio.pptx
+++ b/R PROGRAMMING SESSION 1 Briefing About R and RStudio.pptx
@@ -9,9 +9,12 @@
     <p:sldId id="258" r:id="rId3"/>
     <p:sldId id="260" r:id="rId4"/>
     <p:sldId id="266" r:id="rId5"/>
-    <p:sldId id="261" r:id="rId6"/>
-    <p:sldId id="259" r:id="rId7"/>
-    <p:sldId id="265" r:id="rId8"/>
+    <p:sldId id="267" r:id="rId6"/>
+    <p:sldId id="268" r:id="rId7"/>
+    <p:sldId id="269" r:id="rId8"/>
+    <p:sldId id="261" r:id="rId9"/>
+    <p:sldId id="259" r:id="rId10"/>
+    <p:sldId id="265" r:id="rId11"/>
   </p:sldIdLst>
   <p:sldSz cx="12192000" cy="6858000"/>
   <p:notesSz cx="6858000" cy="9144000"/>
@@ -110,6 +113,11 @@
       </a:defRPr>
     </a:lvl9pPr>
   </p:defaultTextStyle>
+  <p:extLst>
+    <p:ext uri="{EFAFB233-063F-42B5-8137-9DF3F51BA10A}">
+      <p15:sldGuideLst xmlns:p15="http://schemas.microsoft.com/office/powerpoint/2012/main"/>
+    </p:ext>
+  </p:extLst>
 </p:presentation>
 </file>
 
@@ -6829,7 +6837,14 @@
             <p:ph type="title"/>
           </p:nvPr>
         </p:nvSpPr>
-        <p:spPr/>
+        <p:spPr>
+          <a:solidFill>
+            <a:schemeClr val="accent6">
+              <a:lumMod val="20000"/>
+              <a:lumOff val="80000"/>
+            </a:schemeClr>
+          </a:solidFill>
+        </p:spPr>
         <p:txBody>
           <a:bodyPr>
             <a:normAutofit/>
@@ -6837,7 +6852,11 @@
           <a:lstStyle/>
           <a:p>
             <a:r>
-              <a:rPr lang="en-US" sz="3600" b="1" dirty="0"/>
+              <a:rPr lang="en-US" sz="3600" b="1" dirty="0">
+                <a:solidFill>
+                  <a:srgbClr val="7030A0"/>
+                </a:solidFill>
+              </a:rPr>
               <a:t>SESSION 1 : Briefing About R and RStudio</a:t>
             </a:r>
           </a:p>
@@ -6937,6 +6956,86 @@
     <p:extLst>
       <p:ext uri="{BB962C8B-B14F-4D97-AF65-F5344CB8AC3E}">
         <p14:creationId xmlns:p14="http://schemas.microsoft.com/office/powerpoint/2010/main" val="971150839"/>
+      </p:ext>
+    </p:extLst>
+  </p:cSld>
+  <p:clrMapOvr>
+    <a:masterClrMapping/>
+  </p:clrMapOvr>
+</p:sld>
+</file>
+
+<file path=ppt/slides/slide10.xml><?xml version="1.0" encoding="utf-8"?>
+<p:sld xmlns:a="http://schemas.openxmlformats.org/drawingml/2006/main" xmlns:r="http://schemas.openxmlformats.org/officeDocument/2006/relationships" xmlns:p="http://schemas.openxmlformats.org/presentationml/2006/main">
+  <p:cSld>
+    <p:spTree>
+      <p:nvGrpSpPr>
+        <p:cNvPr id="1" name=""/>
+        <p:cNvGrpSpPr/>
+        <p:nvPr/>
+      </p:nvGrpSpPr>
+      <p:grpSpPr>
+        <a:xfrm>
+          <a:off x="0" y="0"/>
+          <a:ext cx="0" cy="0"/>
+          <a:chOff x="0" y="0"/>
+          <a:chExt cx="0" cy="0"/>
+        </a:xfrm>
+      </p:grpSpPr>
+      <p:sp>
+        <p:nvSpPr>
+          <p:cNvPr id="2" name="Title 1">
+            <a:extLst>
+              <a:ext uri="{FF2B5EF4-FFF2-40B4-BE49-F238E27FC236}">
+                <a16:creationId xmlns:a16="http://schemas.microsoft.com/office/drawing/2014/main" id="{373210AB-2CCD-49CA-A336-3816A7508E04}"/>
+              </a:ext>
+            </a:extLst>
+          </p:cNvPr>
+          <p:cNvSpPr>
+            <a:spLocks noGrp="1"/>
+          </p:cNvSpPr>
+          <p:nvPr>
+            <p:ph type="title"/>
+          </p:nvPr>
+        </p:nvSpPr>
+        <p:spPr/>
+        <p:txBody>
+          <a:bodyPr/>
+          <a:lstStyle/>
+          <a:p>
+            <a:endParaRPr lang="en-US" dirty="0"/>
+          </a:p>
+        </p:txBody>
+      </p:sp>
+      <p:sp>
+        <p:nvSpPr>
+          <p:cNvPr id="3" name="Content Placeholder 2">
+            <a:extLst>
+              <a:ext uri="{FF2B5EF4-FFF2-40B4-BE49-F238E27FC236}">
+                <a16:creationId xmlns:a16="http://schemas.microsoft.com/office/drawing/2014/main" id="{B7BAB360-FD0C-4B2D-B946-7E764B6801B2}"/>
+              </a:ext>
+            </a:extLst>
+          </p:cNvPr>
+          <p:cNvSpPr>
+            <a:spLocks noGrp="1"/>
+          </p:cNvSpPr>
+          <p:nvPr>
+            <p:ph idx="1"/>
+          </p:nvPr>
+        </p:nvSpPr>
+        <p:spPr/>
+        <p:txBody>
+          <a:bodyPr/>
+          <a:lstStyle/>
+          <a:p>
+            <a:endParaRPr lang="en-US"/>
+          </a:p>
+        </p:txBody>
+      </p:sp>
+    </p:spTree>
+    <p:extLst>
+      <p:ext uri="{BB962C8B-B14F-4D97-AF65-F5344CB8AC3E}">
+        <p14:creationId xmlns:p14="http://schemas.microsoft.com/office/powerpoint/2010/main" val="51863509"/>
       </p:ext>
     </p:extLst>
   </p:cSld>
@@ -14538,6 +14637,856 @@
 </file>
 
 <file path=ppt/slides/slide5.xml><?xml version="1.0" encoding="utf-8"?>
+<p:sld xmlns:a="http://schemas.openxmlformats.org/drawingml/2006/main" xmlns:r="http://schemas.openxmlformats.org/officeDocument/2006/relationships" xmlns:p="http://schemas.openxmlformats.org/presentationml/2006/main">
+  <p:cSld>
+    <p:spTree>
+      <p:nvGrpSpPr>
+        <p:cNvPr id="1" name=""/>
+        <p:cNvGrpSpPr/>
+        <p:nvPr/>
+      </p:nvGrpSpPr>
+      <p:grpSpPr>
+        <a:xfrm>
+          <a:off x="0" y="0"/>
+          <a:ext cx="0" cy="0"/>
+          <a:chOff x="0" y="0"/>
+          <a:chExt cx="0" cy="0"/>
+        </a:xfrm>
+      </p:grpSpPr>
+      <p:sp>
+        <p:nvSpPr>
+          <p:cNvPr id="2" name="Title 1">
+            <a:extLst>
+              <a:ext uri="{FF2B5EF4-FFF2-40B4-BE49-F238E27FC236}">
+                <a16:creationId xmlns:a16="http://schemas.microsoft.com/office/drawing/2014/main" id="{C996C615-25CB-4FF3-AD5A-7C9CF270E827}"/>
+              </a:ext>
+            </a:extLst>
+          </p:cNvPr>
+          <p:cNvSpPr>
+            <a:spLocks noGrp="1"/>
+          </p:cNvSpPr>
+          <p:nvPr>
+            <p:ph type="title"/>
+          </p:nvPr>
+        </p:nvSpPr>
+        <p:spPr/>
+        <p:txBody>
+          <a:bodyPr/>
+          <a:lstStyle/>
+          <a:p>
+            <a:r>
+              <a:rPr lang="en-US" b="1" dirty="0"/>
+              <a:t>Subtle Comparison with other Tools</a:t>
+            </a:r>
+          </a:p>
+        </p:txBody>
+      </p:sp>
+      <p:sp>
+        <p:nvSpPr>
+          <p:cNvPr id="3" name="Content Placeholder 2">
+            <a:extLst>
+              <a:ext uri="{FF2B5EF4-FFF2-40B4-BE49-F238E27FC236}">
+                <a16:creationId xmlns:a16="http://schemas.microsoft.com/office/drawing/2014/main" id="{5AE4F028-5723-4ED4-B04D-057B02A94418}"/>
+              </a:ext>
+            </a:extLst>
+          </p:cNvPr>
+          <p:cNvSpPr>
+            <a:spLocks noGrp="1"/>
+          </p:cNvSpPr>
+          <p:nvPr>
+            <p:ph idx="1"/>
+          </p:nvPr>
+        </p:nvSpPr>
+        <p:spPr>
+          <a:xfrm>
+            <a:off x="1729908" y="1459855"/>
+            <a:ext cx="3130119" cy="461665"/>
+          </a:xfrm>
+        </p:spPr>
+        <p:txBody>
+          <a:bodyPr>
+            <a:noAutofit/>
+          </a:bodyPr>
+          <a:lstStyle/>
+          <a:p>
+            <a:pPr marL="0" indent="0" algn="ctr">
+              <a:buNone/>
+            </a:pPr>
+            <a:r>
+              <a:rPr lang="en-US" sz="2400" b="1" dirty="0">
+                <a:solidFill>
+                  <a:srgbClr val="7030A0"/>
+                </a:solidFill>
+              </a:rPr>
+              <a:t>R Shiny, </a:t>
+            </a:r>
+            <a:r>
+              <a:rPr lang="en-US" sz="2400" b="1" dirty="0" err="1">
+                <a:solidFill>
+                  <a:srgbClr val="7030A0"/>
+                </a:solidFill>
+              </a:rPr>
+              <a:t>flexdashboard</a:t>
+            </a:r>
+            <a:endParaRPr lang="en-US" sz="2400" b="1" dirty="0">
+              <a:solidFill>
+                <a:srgbClr val="7030A0"/>
+              </a:solidFill>
+            </a:endParaRPr>
+          </a:p>
+        </p:txBody>
+      </p:sp>
+      <p:pic>
+        <p:nvPicPr>
+          <p:cNvPr id="11" name="Picture 10">
+            <a:extLst>
+              <a:ext uri="{FF2B5EF4-FFF2-40B4-BE49-F238E27FC236}">
+                <a16:creationId xmlns:a16="http://schemas.microsoft.com/office/drawing/2014/main" id="{9CAF56E2-7D22-4E5A-BFDB-5453C021A906}"/>
+              </a:ext>
+            </a:extLst>
+          </p:cNvPr>
+          <p:cNvPicPr>
+            <a:picLocks noChangeAspect="1"/>
+          </p:cNvPicPr>
+          <p:nvPr/>
+        </p:nvPicPr>
+        <p:blipFill>
+          <a:blip r:embed="rId2"/>
+          <a:stretch>
+            <a:fillRect/>
+          </a:stretch>
+        </p:blipFill>
+        <p:spPr>
+          <a:xfrm>
+            <a:off x="695785" y="1928372"/>
+            <a:ext cx="5198363" cy="2429219"/>
+          </a:xfrm>
+          <a:prstGeom prst="rect">
+            <a:avLst/>
+          </a:prstGeom>
+        </p:spPr>
+      </p:pic>
+      <p:sp>
+        <p:nvSpPr>
+          <p:cNvPr id="13" name="TextBox 12">
+            <a:extLst>
+              <a:ext uri="{FF2B5EF4-FFF2-40B4-BE49-F238E27FC236}">
+                <a16:creationId xmlns:a16="http://schemas.microsoft.com/office/drawing/2014/main" id="{3C0FDEDF-F99E-4406-97EF-1DD21F223519}"/>
+              </a:ext>
+            </a:extLst>
+          </p:cNvPr>
+          <p:cNvSpPr txBox="1"/>
+          <p:nvPr/>
+        </p:nvSpPr>
+        <p:spPr>
+          <a:xfrm>
+            <a:off x="6526197" y="1439706"/>
+            <a:ext cx="4862745" cy="461665"/>
+          </a:xfrm>
+          <a:prstGeom prst="rect">
+            <a:avLst/>
+          </a:prstGeom>
+          <a:noFill/>
+        </p:spPr>
+        <p:txBody>
+          <a:bodyPr wrap="square">
+            <a:spAutoFit/>
+          </a:bodyPr>
+          <a:lstStyle/>
+          <a:p>
+            <a:pPr algn="ctr"/>
+            <a:r>
+              <a:rPr lang="en-US" sz="2400" b="1" dirty="0">
+                <a:solidFill>
+                  <a:srgbClr val="7030A0"/>
+                </a:solidFill>
+              </a:rPr>
+              <a:t>Tableau/Power BI/Qlik View</a:t>
+            </a:r>
+          </a:p>
+        </p:txBody>
+      </p:sp>
+      <p:pic>
+        <p:nvPicPr>
+          <p:cNvPr id="17" name="Picture 16">
+            <a:extLst>
+              <a:ext uri="{FF2B5EF4-FFF2-40B4-BE49-F238E27FC236}">
+                <a16:creationId xmlns:a16="http://schemas.microsoft.com/office/drawing/2014/main" id="{684C048F-86D5-4DD8-B6AD-0898B385D5DB}"/>
+              </a:ext>
+            </a:extLst>
+          </p:cNvPr>
+          <p:cNvPicPr>
+            <a:picLocks noChangeAspect="1"/>
+          </p:cNvPicPr>
+          <p:nvPr/>
+        </p:nvPicPr>
+        <p:blipFill>
+          <a:blip r:embed="rId3"/>
+          <a:stretch>
+            <a:fillRect/>
+          </a:stretch>
+        </p:blipFill>
+        <p:spPr>
+          <a:xfrm>
+            <a:off x="6526198" y="1873628"/>
+            <a:ext cx="4862744" cy="2538706"/>
+          </a:xfrm>
+          <a:prstGeom prst="rect">
+            <a:avLst/>
+          </a:prstGeom>
+        </p:spPr>
+      </p:pic>
+      <p:grpSp>
+        <p:nvGrpSpPr>
+          <p:cNvPr id="26" name="Group 25">
+            <a:extLst>
+              <a:ext uri="{FF2B5EF4-FFF2-40B4-BE49-F238E27FC236}">
+                <a16:creationId xmlns:a16="http://schemas.microsoft.com/office/drawing/2014/main" id="{4BF56035-97AD-43EF-90ED-89469E4EBE0D}"/>
+              </a:ext>
+            </a:extLst>
+          </p:cNvPr>
+          <p:cNvGrpSpPr/>
+          <p:nvPr/>
+        </p:nvGrpSpPr>
+        <p:grpSpPr>
+          <a:xfrm>
+            <a:off x="6460168" y="4438015"/>
+            <a:ext cx="4994801" cy="1098001"/>
+            <a:chOff x="6394141" y="4874309"/>
+            <a:chExt cx="4994801" cy="1098001"/>
+          </a:xfrm>
+        </p:grpSpPr>
+        <p:sp>
+          <p:nvSpPr>
+            <p:cNvPr id="19" name="TextBox 18">
+              <a:extLst>
+                <a:ext uri="{FF2B5EF4-FFF2-40B4-BE49-F238E27FC236}">
+                  <a16:creationId xmlns:a16="http://schemas.microsoft.com/office/drawing/2014/main" id="{FC088D9D-106A-4AF0-8DA2-3415005364D0}"/>
+                </a:ext>
+              </a:extLst>
+            </p:cNvPr>
+            <p:cNvSpPr txBox="1"/>
+            <p:nvPr/>
+          </p:nvSpPr>
+          <p:spPr>
+            <a:xfrm>
+              <a:off x="6394141" y="5109072"/>
+              <a:ext cx="2820880" cy="246221"/>
+            </a:xfrm>
+            <a:prstGeom prst="rect">
+              <a:avLst/>
+            </a:prstGeom>
+            <a:noFill/>
+          </p:spPr>
+          <p:txBody>
+            <a:bodyPr wrap="square">
+              <a:spAutoFit/>
+            </a:bodyPr>
+            <a:lstStyle/>
+            <a:p>
+              <a:r>
+                <a:rPr lang="en-US" sz="1000" dirty="0"/>
+                <a:t>https://www.tableau.com/products/cloud-bi</a:t>
+              </a:r>
+            </a:p>
+          </p:txBody>
+        </p:sp>
+        <p:sp>
+          <p:nvSpPr>
+            <p:cNvPr id="21" name="TextBox 20">
+              <a:extLst>
+                <a:ext uri="{FF2B5EF4-FFF2-40B4-BE49-F238E27FC236}">
+                  <a16:creationId xmlns:a16="http://schemas.microsoft.com/office/drawing/2014/main" id="{28C3A796-406A-4B92-9C90-6D92784D4CC7}"/>
+                </a:ext>
+              </a:extLst>
+            </p:cNvPr>
+            <p:cNvSpPr txBox="1"/>
+            <p:nvPr/>
+          </p:nvSpPr>
+          <p:spPr>
+            <a:xfrm>
+              <a:off x="6394141" y="4874309"/>
+              <a:ext cx="840050" cy="261610"/>
+            </a:xfrm>
+            <a:prstGeom prst="rect">
+              <a:avLst/>
+            </a:prstGeom>
+            <a:noFill/>
+          </p:spPr>
+          <p:txBody>
+            <a:bodyPr wrap="square" rtlCol="0">
+              <a:spAutoFit/>
+            </a:bodyPr>
+            <a:lstStyle/>
+            <a:p>
+              <a:r>
+                <a:rPr lang="en-US" sz="1100" b="1" dirty="0"/>
+                <a:t>Source</a:t>
+              </a:r>
+            </a:p>
+          </p:txBody>
+        </p:sp>
+        <p:sp>
+          <p:nvSpPr>
+            <p:cNvPr id="23" name="TextBox 22">
+              <a:extLst>
+                <a:ext uri="{FF2B5EF4-FFF2-40B4-BE49-F238E27FC236}">
+                  <a16:creationId xmlns:a16="http://schemas.microsoft.com/office/drawing/2014/main" id="{38D0DB5E-8232-43B0-A161-50678B02E875}"/>
+                </a:ext>
+              </a:extLst>
+            </p:cNvPr>
+            <p:cNvSpPr txBox="1"/>
+            <p:nvPr/>
+          </p:nvSpPr>
+          <p:spPr>
+            <a:xfrm>
+              <a:off x="6394142" y="5695311"/>
+              <a:ext cx="4994800" cy="276999"/>
+            </a:xfrm>
+            <a:prstGeom prst="rect">
+              <a:avLst/>
+            </a:prstGeom>
+            <a:solidFill>
+              <a:schemeClr val="accent6">
+                <a:lumMod val="20000"/>
+                <a:lumOff val="80000"/>
+              </a:schemeClr>
+            </a:solidFill>
+          </p:spPr>
+          <p:txBody>
+            <a:bodyPr wrap="square" rtlCol="0">
+              <a:spAutoFit/>
+            </a:bodyPr>
+            <a:lstStyle/>
+            <a:p>
+              <a:r>
+                <a:rPr lang="en-US" sz="1200" dirty="0"/>
+                <a:t>Pricing &gt;&gt;             70$ </a:t>
+              </a:r>
+              <a:r>
+                <a:rPr lang="en-US" sz="1200" b="0" i="0" dirty="0">
+                  <a:solidFill>
+                    <a:srgbClr val="333333"/>
+                  </a:solidFill>
+                  <a:effectLst/>
+                  <a:latin typeface="Benton Sans Medium"/>
+                </a:rPr>
+                <a:t>user/month billed annually </a:t>
+              </a:r>
+              <a:endParaRPr lang="en-US" sz="1200" dirty="0"/>
+            </a:p>
+          </p:txBody>
+        </p:sp>
+      </p:grpSp>
+      <p:grpSp>
+        <p:nvGrpSpPr>
+          <p:cNvPr id="25" name="Group 24">
+            <a:extLst>
+              <a:ext uri="{FF2B5EF4-FFF2-40B4-BE49-F238E27FC236}">
+                <a16:creationId xmlns:a16="http://schemas.microsoft.com/office/drawing/2014/main" id="{B4C799E6-5DE5-490C-873E-20630585B664}"/>
+              </a:ext>
+            </a:extLst>
+          </p:cNvPr>
+          <p:cNvGrpSpPr/>
+          <p:nvPr/>
+        </p:nvGrpSpPr>
+        <p:grpSpPr>
+          <a:xfrm>
+            <a:off x="619214" y="4423463"/>
+            <a:ext cx="5351504" cy="1633358"/>
+            <a:chOff x="619217" y="4874309"/>
+            <a:chExt cx="5351504" cy="1633358"/>
+          </a:xfrm>
+        </p:grpSpPr>
+        <p:sp>
+          <p:nvSpPr>
+            <p:cNvPr id="15" name="TextBox 14">
+              <a:extLst>
+                <a:ext uri="{FF2B5EF4-FFF2-40B4-BE49-F238E27FC236}">
+                  <a16:creationId xmlns:a16="http://schemas.microsoft.com/office/drawing/2014/main" id="{FB43EB28-24C4-4BD3-A245-05C08B99496A}"/>
+                </a:ext>
+              </a:extLst>
+            </p:cNvPr>
+            <p:cNvSpPr txBox="1"/>
+            <p:nvPr/>
+          </p:nvSpPr>
+          <p:spPr>
+            <a:xfrm>
+              <a:off x="619217" y="5109072"/>
+              <a:ext cx="5351504" cy="415498"/>
+            </a:xfrm>
+            <a:prstGeom prst="rect">
+              <a:avLst/>
+            </a:prstGeom>
+            <a:noFill/>
+          </p:spPr>
+          <p:txBody>
+            <a:bodyPr wrap="square">
+              <a:spAutoFit/>
+            </a:bodyPr>
+            <a:lstStyle/>
+            <a:p>
+              <a:r>
+                <a:rPr lang="en-US" sz="1000" dirty="0"/>
+                <a:t>https://gadenbuie.shinyapps.io/tweet-conf-dash/?_ga=2.121046656.984439988.1631514451-767271589.1623651113</a:t>
+              </a:r>
+            </a:p>
+          </p:txBody>
+        </p:sp>
+        <p:sp>
+          <p:nvSpPr>
+            <p:cNvPr id="20" name="TextBox 19">
+              <a:extLst>
+                <a:ext uri="{FF2B5EF4-FFF2-40B4-BE49-F238E27FC236}">
+                  <a16:creationId xmlns:a16="http://schemas.microsoft.com/office/drawing/2014/main" id="{881BE9D8-1DE5-47F4-BBDA-D2ED0D4250B3}"/>
+                </a:ext>
+              </a:extLst>
+            </p:cNvPr>
+            <p:cNvSpPr txBox="1"/>
+            <p:nvPr/>
+          </p:nvSpPr>
+          <p:spPr>
+            <a:xfrm>
+              <a:off x="619217" y="4874309"/>
+              <a:ext cx="840050" cy="261610"/>
+            </a:xfrm>
+            <a:prstGeom prst="rect">
+              <a:avLst/>
+            </a:prstGeom>
+            <a:noFill/>
+          </p:spPr>
+          <p:txBody>
+            <a:bodyPr wrap="square" rtlCol="0">
+              <a:spAutoFit/>
+            </a:bodyPr>
+            <a:lstStyle/>
+            <a:p>
+              <a:r>
+                <a:rPr lang="en-US" sz="1100" b="1" dirty="0"/>
+                <a:t>Source</a:t>
+              </a:r>
+            </a:p>
+          </p:txBody>
+        </p:sp>
+        <p:sp>
+          <p:nvSpPr>
+            <p:cNvPr id="22" name="TextBox 21">
+              <a:extLst>
+                <a:ext uri="{FF2B5EF4-FFF2-40B4-BE49-F238E27FC236}">
+                  <a16:creationId xmlns:a16="http://schemas.microsoft.com/office/drawing/2014/main" id="{63BB54F2-536B-46B1-ADBA-C2CDA63D36E9}"/>
+                </a:ext>
+              </a:extLst>
+            </p:cNvPr>
+            <p:cNvSpPr txBox="1"/>
+            <p:nvPr/>
+          </p:nvSpPr>
+          <p:spPr>
+            <a:xfrm>
+              <a:off x="695787" y="5708342"/>
+              <a:ext cx="4994799" cy="276999"/>
+            </a:xfrm>
+            <a:prstGeom prst="rect">
+              <a:avLst/>
+            </a:prstGeom>
+            <a:solidFill>
+              <a:schemeClr val="accent6">
+                <a:lumMod val="20000"/>
+                <a:lumOff val="80000"/>
+              </a:schemeClr>
+            </a:solidFill>
+          </p:spPr>
+          <p:txBody>
+            <a:bodyPr wrap="square" rtlCol="0">
+              <a:spAutoFit/>
+            </a:bodyPr>
+            <a:lstStyle/>
+            <a:p>
+              <a:r>
+                <a:rPr lang="en-US" sz="1200" dirty="0"/>
+                <a:t>Pricing &gt;&gt;                  Free of Cost</a:t>
+              </a:r>
+            </a:p>
+          </p:txBody>
+        </p:sp>
+        <p:sp>
+          <p:nvSpPr>
+            <p:cNvPr id="24" name="TextBox 23">
+              <a:extLst>
+                <a:ext uri="{FF2B5EF4-FFF2-40B4-BE49-F238E27FC236}">
+                  <a16:creationId xmlns:a16="http://schemas.microsoft.com/office/drawing/2014/main" id="{4DDA7A12-E2B3-4418-82D5-1ED565BC3160}"/>
+                </a:ext>
+              </a:extLst>
+            </p:cNvPr>
+            <p:cNvSpPr txBox="1"/>
+            <p:nvPr/>
+          </p:nvSpPr>
+          <p:spPr>
+            <a:xfrm>
+              <a:off x="695786" y="6230668"/>
+              <a:ext cx="4994799" cy="276999"/>
+            </a:xfrm>
+            <a:prstGeom prst="rect">
+              <a:avLst/>
+            </a:prstGeom>
+            <a:solidFill>
+              <a:schemeClr val="accent6">
+                <a:lumMod val="20000"/>
+                <a:lumOff val="80000"/>
+              </a:schemeClr>
+            </a:solidFill>
+          </p:spPr>
+          <p:txBody>
+            <a:bodyPr wrap="square" rtlCol="0">
+              <a:spAutoFit/>
+            </a:bodyPr>
+            <a:lstStyle/>
+            <a:p>
+              <a:r>
+                <a:rPr lang="en-US" sz="1200" dirty="0"/>
+                <a:t>R &amp; Shiny combine both Machine Learning &amp; decision making</a:t>
+              </a:r>
+            </a:p>
+          </p:txBody>
+        </p:sp>
+      </p:grpSp>
+      <p:sp>
+        <p:nvSpPr>
+          <p:cNvPr id="27" name="TextBox 26">
+            <a:extLst>
+              <a:ext uri="{FF2B5EF4-FFF2-40B4-BE49-F238E27FC236}">
+                <a16:creationId xmlns:a16="http://schemas.microsoft.com/office/drawing/2014/main" id="{E1B59C64-93ED-4C19-87F7-601C5379C10B}"/>
+              </a:ext>
+            </a:extLst>
+          </p:cNvPr>
+          <p:cNvSpPr txBox="1"/>
+          <p:nvPr/>
+        </p:nvSpPr>
+        <p:spPr>
+          <a:xfrm>
+            <a:off x="6442408" y="5765682"/>
+            <a:ext cx="4994799" cy="276999"/>
+          </a:xfrm>
+          <a:prstGeom prst="rect">
+            <a:avLst/>
+          </a:prstGeom>
+          <a:solidFill>
+            <a:schemeClr val="accent6">
+              <a:lumMod val="20000"/>
+              <a:lumOff val="80000"/>
+            </a:schemeClr>
+          </a:solidFill>
+        </p:spPr>
+        <p:txBody>
+          <a:bodyPr wrap="square" rtlCol="0">
+            <a:spAutoFit/>
+          </a:bodyPr>
+          <a:lstStyle/>
+          <a:p>
+            <a:r>
+              <a:rPr lang="en-US" sz="1200" dirty="0"/>
+              <a:t>Cannot do decision making on its own. Its for dashboarding primarily</a:t>
+            </a:r>
+          </a:p>
+        </p:txBody>
+      </p:sp>
+      <p:sp>
+        <p:nvSpPr>
+          <p:cNvPr id="28" name="TextBox 27">
+            <a:extLst>
+              <a:ext uri="{FF2B5EF4-FFF2-40B4-BE49-F238E27FC236}">
+                <a16:creationId xmlns:a16="http://schemas.microsoft.com/office/drawing/2014/main" id="{30D24B17-DF14-46DF-838E-4F74C117C164}"/>
+              </a:ext>
+            </a:extLst>
+          </p:cNvPr>
+          <p:cNvSpPr txBox="1"/>
+          <p:nvPr/>
+        </p:nvSpPr>
+        <p:spPr>
+          <a:xfrm>
+            <a:off x="695782" y="6281308"/>
+            <a:ext cx="4994799" cy="461665"/>
+          </a:xfrm>
+          <a:prstGeom prst="rect">
+            <a:avLst/>
+          </a:prstGeom>
+          <a:solidFill>
+            <a:schemeClr val="accent6">
+              <a:lumMod val="20000"/>
+              <a:lumOff val="80000"/>
+            </a:schemeClr>
+          </a:solidFill>
+        </p:spPr>
+        <p:txBody>
+          <a:bodyPr wrap="square" rtlCol="0">
+            <a:spAutoFit/>
+          </a:bodyPr>
+          <a:lstStyle/>
+          <a:p>
+            <a:r>
+              <a:rPr lang="en-US" sz="1200" dirty="0"/>
+              <a:t>Application security not limited to terms and condition, can be customized without much cost</a:t>
+            </a:r>
+          </a:p>
+        </p:txBody>
+      </p:sp>
+      <p:sp>
+        <p:nvSpPr>
+          <p:cNvPr id="29" name="TextBox 28">
+            <a:extLst>
+              <a:ext uri="{FF2B5EF4-FFF2-40B4-BE49-F238E27FC236}">
+                <a16:creationId xmlns:a16="http://schemas.microsoft.com/office/drawing/2014/main" id="{28A65D90-B105-40A9-B357-4B5AFC18022C}"/>
+              </a:ext>
+            </a:extLst>
+          </p:cNvPr>
+          <p:cNvSpPr txBox="1"/>
+          <p:nvPr/>
+        </p:nvSpPr>
+        <p:spPr>
+          <a:xfrm>
+            <a:off x="6442407" y="6262042"/>
+            <a:ext cx="4994799" cy="461665"/>
+          </a:xfrm>
+          <a:prstGeom prst="rect">
+            <a:avLst/>
+          </a:prstGeom>
+          <a:solidFill>
+            <a:schemeClr val="accent6">
+              <a:lumMod val="20000"/>
+              <a:lumOff val="80000"/>
+            </a:schemeClr>
+          </a:solidFill>
+        </p:spPr>
+        <p:txBody>
+          <a:bodyPr wrap="square" rtlCol="0">
+            <a:spAutoFit/>
+          </a:bodyPr>
+          <a:lstStyle/>
+          <a:p>
+            <a:r>
+              <a:rPr lang="en-US" sz="1200" dirty="0"/>
+              <a:t>Application security limited to terms and condition and customization can be expensive</a:t>
+            </a:r>
+          </a:p>
+        </p:txBody>
+      </p:sp>
+    </p:spTree>
+    <p:extLst>
+      <p:ext uri="{BB962C8B-B14F-4D97-AF65-F5344CB8AC3E}">
+        <p14:creationId xmlns:p14="http://schemas.microsoft.com/office/powerpoint/2010/main" val="2853803640"/>
+      </p:ext>
+    </p:extLst>
+  </p:cSld>
+  <p:clrMapOvr>
+    <a:masterClrMapping/>
+  </p:clrMapOvr>
+</p:sld>
+</file>
+
+<file path=ppt/slides/slide6.xml><?xml version="1.0" encoding="utf-8"?>
+<p:sld xmlns:a="http://schemas.openxmlformats.org/drawingml/2006/main" xmlns:r="http://schemas.openxmlformats.org/officeDocument/2006/relationships" xmlns:p="http://schemas.openxmlformats.org/presentationml/2006/main">
+  <p:cSld>
+    <p:spTree>
+      <p:nvGrpSpPr>
+        <p:cNvPr id="1" name=""/>
+        <p:cNvGrpSpPr/>
+        <p:nvPr/>
+      </p:nvGrpSpPr>
+      <p:grpSpPr>
+        <a:xfrm>
+          <a:off x="0" y="0"/>
+          <a:ext cx="0" cy="0"/>
+          <a:chOff x="0" y="0"/>
+          <a:chExt cx="0" cy="0"/>
+        </a:xfrm>
+      </p:grpSpPr>
+      <p:sp>
+        <p:nvSpPr>
+          <p:cNvPr id="2" name="Title 1">
+            <a:extLst>
+              <a:ext uri="{FF2B5EF4-FFF2-40B4-BE49-F238E27FC236}">
+                <a16:creationId xmlns:a16="http://schemas.microsoft.com/office/drawing/2014/main" id="{4244F6F7-7BF0-47FA-A422-D2961609188F}"/>
+              </a:ext>
+            </a:extLst>
+          </p:cNvPr>
+          <p:cNvSpPr>
+            <a:spLocks noGrp="1"/>
+          </p:cNvSpPr>
+          <p:nvPr>
+            <p:ph type="title"/>
+          </p:nvPr>
+        </p:nvSpPr>
+        <p:spPr/>
+        <p:txBody>
+          <a:bodyPr/>
+          <a:lstStyle/>
+          <a:p>
+            <a:r>
+              <a:rPr lang="en-US" b="1" dirty="0"/>
+              <a:t>Subtle Comparison with other Tools</a:t>
+            </a:r>
+            <a:endParaRPr lang="en-US" dirty="0"/>
+          </a:p>
+        </p:txBody>
+      </p:sp>
+      <p:sp>
+        <p:nvSpPr>
+          <p:cNvPr id="4" name="Content Placeholder 3">
+            <a:extLst>
+              <a:ext uri="{FF2B5EF4-FFF2-40B4-BE49-F238E27FC236}">
+                <a16:creationId xmlns:a16="http://schemas.microsoft.com/office/drawing/2014/main" id="{96AF33A4-42D2-46BD-B2C7-787E9B79ED8A}"/>
+              </a:ext>
+            </a:extLst>
+          </p:cNvPr>
+          <p:cNvSpPr txBox="1">
+            <a:spLocks noGrp="1"/>
+          </p:cNvSpPr>
+          <p:nvPr>
+            <p:ph idx="1"/>
+          </p:nvPr>
+        </p:nvSpPr>
+        <p:spPr>
+          <a:xfrm>
+            <a:off x="838200" y="1825625"/>
+            <a:ext cx="10515600" cy="940770"/>
+          </a:xfrm>
+          <a:prstGeom prst="rect">
+            <a:avLst/>
+          </a:prstGeom>
+          <a:noFill/>
+        </p:spPr>
+        <p:txBody>
+          <a:bodyPr wrap="square">
+            <a:spAutoFit/>
+          </a:bodyPr>
+          <a:lstStyle/>
+          <a:p>
+            <a:pPr marL="0" indent="0">
+              <a:buNone/>
+            </a:pPr>
+            <a:r>
+              <a:rPr lang="en-US" sz="2400" dirty="0"/>
+              <a:t>R Vs Python</a:t>
+            </a:r>
+          </a:p>
+          <a:p>
+            <a:pPr marL="0" indent="0" algn="ctr">
+              <a:buNone/>
+            </a:pPr>
+            <a:endParaRPr lang="en-US" dirty="0"/>
+          </a:p>
+        </p:txBody>
+      </p:sp>
+    </p:spTree>
+    <p:extLst>
+      <p:ext uri="{BB962C8B-B14F-4D97-AF65-F5344CB8AC3E}">
+        <p14:creationId xmlns:p14="http://schemas.microsoft.com/office/powerpoint/2010/main" val="1603055404"/>
+      </p:ext>
+    </p:extLst>
+  </p:cSld>
+  <p:clrMapOvr>
+    <a:masterClrMapping/>
+  </p:clrMapOvr>
+</p:sld>
+</file>
+
+<file path=ppt/slides/slide7.xml><?xml version="1.0" encoding="utf-8"?>
+<p:sld xmlns:a="http://schemas.openxmlformats.org/drawingml/2006/main" xmlns:r="http://schemas.openxmlformats.org/officeDocument/2006/relationships" xmlns:p="http://schemas.openxmlformats.org/presentationml/2006/main">
+  <p:cSld>
+    <p:spTree>
+      <p:nvGrpSpPr>
+        <p:cNvPr id="1" name=""/>
+        <p:cNvGrpSpPr/>
+        <p:nvPr/>
+      </p:nvGrpSpPr>
+      <p:grpSpPr>
+        <a:xfrm>
+          <a:off x="0" y="0"/>
+          <a:ext cx="0" cy="0"/>
+          <a:chOff x="0" y="0"/>
+          <a:chExt cx="0" cy="0"/>
+        </a:xfrm>
+      </p:grpSpPr>
+      <p:sp>
+        <p:nvSpPr>
+          <p:cNvPr id="2" name="Title 1">
+            <a:extLst>
+              <a:ext uri="{FF2B5EF4-FFF2-40B4-BE49-F238E27FC236}">
+                <a16:creationId xmlns:a16="http://schemas.microsoft.com/office/drawing/2014/main" id="{0CC84965-02EB-4AD7-A117-DA5B985C7A55}"/>
+              </a:ext>
+            </a:extLst>
+          </p:cNvPr>
+          <p:cNvSpPr>
+            <a:spLocks noGrp="1"/>
+          </p:cNvSpPr>
+          <p:nvPr>
+            <p:ph type="title"/>
+          </p:nvPr>
+        </p:nvSpPr>
+        <p:spPr/>
+        <p:txBody>
+          <a:bodyPr/>
+          <a:lstStyle/>
+          <a:p>
+            <a:endParaRPr lang="en-US"/>
+          </a:p>
+        </p:txBody>
+      </p:sp>
+      <p:sp>
+        <p:nvSpPr>
+          <p:cNvPr id="4" name="Content Placeholder 3">
+            <a:extLst>
+              <a:ext uri="{FF2B5EF4-FFF2-40B4-BE49-F238E27FC236}">
+                <a16:creationId xmlns:a16="http://schemas.microsoft.com/office/drawing/2014/main" id="{128662DC-BB1F-4A82-8646-0881EB66CE70}"/>
+              </a:ext>
+            </a:extLst>
+          </p:cNvPr>
+          <p:cNvSpPr txBox="1">
+            <a:spLocks noGrp="1"/>
+          </p:cNvSpPr>
+          <p:nvPr>
+            <p:ph idx="1"/>
+          </p:nvPr>
+        </p:nvSpPr>
+        <p:spPr>
+          <a:xfrm>
+            <a:off x="656948" y="1825625"/>
+            <a:ext cx="10696852" cy="424732"/>
+          </a:xfrm>
+          <a:prstGeom prst="rect">
+            <a:avLst/>
+          </a:prstGeom>
+          <a:noFill/>
+        </p:spPr>
+        <p:txBody>
+          <a:bodyPr wrap="square">
+            <a:spAutoFit/>
+          </a:bodyPr>
+          <a:lstStyle/>
+          <a:p>
+            <a:pPr marL="0" indent="0" algn="ctr">
+              <a:buNone/>
+            </a:pPr>
+            <a:r>
+              <a:rPr lang="en-US" sz="2400" dirty="0"/>
+              <a:t>Application Development (API) using Postman + Plumber in R Vs Python ……</a:t>
+            </a:r>
+          </a:p>
+        </p:txBody>
+      </p:sp>
+    </p:spTree>
+    <p:extLst>
+      <p:ext uri="{BB962C8B-B14F-4D97-AF65-F5344CB8AC3E}">
+        <p14:creationId xmlns:p14="http://schemas.microsoft.com/office/powerpoint/2010/main" val="707769669"/>
+      </p:ext>
+    </p:extLst>
+  </p:cSld>
+  <p:clrMapOvr>
+    <a:masterClrMapping/>
+  </p:clrMapOvr>
+</p:sld>
+</file>
+
+<file path=ppt/slides/slide8.xml><?xml version="1.0" encoding="utf-8"?>
 <p:sld xmlns:a="http://schemas.openxmlformats.org/drawingml/2006/main" xmlns:r="http://schemas.openxmlformats.org/officeDocument/2006/relationships" xmlns:p="http://schemas.openxmlformats.org/presentationml/2006/main">
   <p:cSld>
     <p:spTree>
@@ -16911,7 +17860,7 @@
 </p:sld>
 </file>
 
-<file path=ppt/slides/slide6.xml><?xml version="1.0" encoding="utf-8"?>
+<file path=ppt/slides/slide9.xml><?xml version="1.0" encoding="utf-8"?>
 <p:sld xmlns:a="http://schemas.openxmlformats.org/drawingml/2006/main" xmlns:r="http://schemas.openxmlformats.org/officeDocument/2006/relationships" xmlns:p="http://schemas.openxmlformats.org/presentationml/2006/main">
   <p:cSld>
     <p:spTree>
@@ -17259,86 +18208,6 @@
 </p:sld>
 </file>
 
-<file path=ppt/slides/slide7.xml><?xml version="1.0" encoding="utf-8"?>
-<p:sld xmlns:a="http://schemas.openxmlformats.org/drawingml/2006/main" xmlns:r="http://schemas.openxmlformats.org/officeDocument/2006/relationships" xmlns:p="http://schemas.openxmlformats.org/presentationml/2006/main">
-  <p:cSld>
-    <p:spTree>
-      <p:nvGrpSpPr>
-        <p:cNvPr id="1" name=""/>
-        <p:cNvGrpSpPr/>
-        <p:nvPr/>
-      </p:nvGrpSpPr>
-      <p:grpSpPr>
-        <a:xfrm>
-          <a:off x="0" y="0"/>
-          <a:ext cx="0" cy="0"/>
-          <a:chOff x="0" y="0"/>
-          <a:chExt cx="0" cy="0"/>
-        </a:xfrm>
-      </p:grpSpPr>
-      <p:sp>
-        <p:nvSpPr>
-          <p:cNvPr id="2" name="Title 1">
-            <a:extLst>
-              <a:ext uri="{FF2B5EF4-FFF2-40B4-BE49-F238E27FC236}">
-                <a16:creationId xmlns:a16="http://schemas.microsoft.com/office/drawing/2014/main" id="{373210AB-2CCD-49CA-A336-3816A7508E04}"/>
-              </a:ext>
-            </a:extLst>
-          </p:cNvPr>
-          <p:cNvSpPr>
-            <a:spLocks noGrp="1"/>
-          </p:cNvSpPr>
-          <p:nvPr>
-            <p:ph type="title"/>
-          </p:nvPr>
-        </p:nvSpPr>
-        <p:spPr/>
-        <p:txBody>
-          <a:bodyPr/>
-          <a:lstStyle/>
-          <a:p>
-            <a:endParaRPr lang="en-US" dirty="0"/>
-          </a:p>
-        </p:txBody>
-      </p:sp>
-      <p:sp>
-        <p:nvSpPr>
-          <p:cNvPr id="3" name="Content Placeholder 2">
-            <a:extLst>
-              <a:ext uri="{FF2B5EF4-FFF2-40B4-BE49-F238E27FC236}">
-                <a16:creationId xmlns:a16="http://schemas.microsoft.com/office/drawing/2014/main" id="{B7BAB360-FD0C-4B2D-B946-7E764B6801B2}"/>
-              </a:ext>
-            </a:extLst>
-          </p:cNvPr>
-          <p:cNvSpPr>
-            <a:spLocks noGrp="1"/>
-          </p:cNvSpPr>
-          <p:nvPr>
-            <p:ph idx="1"/>
-          </p:nvPr>
-        </p:nvSpPr>
-        <p:spPr/>
-        <p:txBody>
-          <a:bodyPr/>
-          <a:lstStyle/>
-          <a:p>
-            <a:endParaRPr lang="en-US"/>
-          </a:p>
-        </p:txBody>
-      </p:sp>
-    </p:spTree>
-    <p:extLst>
-      <p:ext uri="{BB962C8B-B14F-4D97-AF65-F5344CB8AC3E}">
-        <p14:creationId xmlns:p14="http://schemas.microsoft.com/office/powerpoint/2010/main" val="51863509"/>
-      </p:ext>
-    </p:extLst>
-  </p:cSld>
-  <p:clrMapOvr>
-    <a:masterClrMapping/>
-  </p:clrMapOvr>
-</p:sld>
-</file>
-
 <file path=ppt/theme/theme1.xml><?xml version="1.0" encoding="utf-8"?>
 <a:theme xmlns:a="http://schemas.openxmlformats.org/drawingml/2006/main" name="Office Theme">
   <a:themeElements>

</xml_diff>